<commit_message>
added extra info to register viewer
</commit_message>
<xml_diff>
--- a/Documentation/Presentation/6502 Debugger.pptx
+++ b/Documentation/Presentation/6502 Debugger.pptx
@@ -10,6 +10,7 @@
     <p:sldId id="258" r:id="rId4"/>
     <p:sldId id="259" r:id="rId5"/>
     <p:sldId id="260" r:id="rId6"/>
+    <p:sldId id="261" r:id="rId7"/>
   </p:sldIdLst>
   <p:sldSz cx="12192000" cy="6858000"/>
   <p:notesSz cx="6858000" cy="9144000"/>
@@ -5129,7 +5130,7 @@
         <p:spPr>
           <a:xfrm>
             <a:off x="802653" y="2389751"/>
-            <a:ext cx="3434067" cy="3139321"/>
+            <a:ext cx="3434067" cy="3970318"/>
           </a:xfrm>
           <a:prstGeom prst="rect">
             <a:avLst/>
@@ -5166,10 +5167,338 @@
             <a:endParaRPr lang="en-US" dirty="0"/>
           </a:p>
           <a:p>
-            <a:endParaRPr lang="en-US" dirty="0"/>
-          </a:p>
-          <a:p>
-            <a:endParaRPr lang="en-US" dirty="0"/>
+            <a:r>
+              <a:rPr lang="en-US" dirty="0"/>
+              <a:t>Written completely separate from the processor</a:t>
+            </a:r>
+          </a:p>
+          <a:p>
+            <a:endParaRPr lang="en-US" dirty="0"/>
+          </a:p>
+          <a:p>
+            <a:endParaRPr lang="en-US" dirty="0"/>
+          </a:p>
+          <a:p>
+            <a:endParaRPr lang="en-US" dirty="0"/>
+          </a:p>
+        </p:txBody>
+      </p:sp>
+      <p:pic>
+        <p:nvPicPr>
+          <p:cNvPr id="3" name="Picture 2"/>
+          <p:cNvPicPr>
+            <a:picLocks noChangeAspect="1"/>
+          </p:cNvPicPr>
+          <p:nvPr/>
+        </p:nvPicPr>
+        <p:blipFill>
+          <a:blip r:embed="rId3"/>
+          <a:stretch>
+            <a:fillRect/>
+          </a:stretch>
+        </p:blipFill>
+        <p:spPr>
+          <a:xfrm>
+            <a:off x="4448175" y="1606963"/>
+            <a:ext cx="7248525" cy="3791400"/>
+          </a:xfrm>
+          <a:prstGeom prst="rect">
+            <a:avLst/>
+          </a:prstGeom>
+        </p:spPr>
+      </p:pic>
+      <p:sp>
+        <p:nvSpPr>
+          <p:cNvPr id="8" name="TextBox 7"/>
+          <p:cNvSpPr txBox="1"/>
+          <p:nvPr/>
+        </p:nvSpPr>
+        <p:spPr>
+          <a:xfrm>
+            <a:off x="5627082" y="1507093"/>
+            <a:ext cx="3728430" cy="369332"/>
+          </a:xfrm>
+          <a:prstGeom prst="rect">
+            <a:avLst/>
+          </a:prstGeom>
+          <a:noFill/>
+        </p:spPr>
+        <p:txBody>
+          <a:bodyPr wrap="square" rtlCol="0">
+            <a:spAutoFit/>
+          </a:bodyPr>
+          <a:lstStyle/>
+          <a:p>
+            <a:r>
+              <a:rPr lang="en-US" b="1" dirty="0"/>
+              <a:t>GUI for Debugger</a:t>
+            </a:r>
+          </a:p>
+        </p:txBody>
+      </p:sp>
+      <p:sp>
+        <p:nvSpPr>
+          <p:cNvPr id="9" name="TextBox 8"/>
+          <p:cNvSpPr txBox="1"/>
+          <p:nvPr/>
+        </p:nvSpPr>
+        <p:spPr>
+          <a:xfrm>
+            <a:off x="8463570" y="1522452"/>
+            <a:ext cx="3728430" cy="369332"/>
+          </a:xfrm>
+          <a:prstGeom prst="rect">
+            <a:avLst/>
+          </a:prstGeom>
+          <a:noFill/>
+        </p:spPr>
+        <p:txBody>
+          <a:bodyPr wrap="square" rtlCol="0">
+            <a:spAutoFit/>
+          </a:bodyPr>
+          <a:lstStyle/>
+          <a:p>
+            <a:r>
+              <a:rPr lang="en-US" b="1" dirty="0"/>
+              <a:t>Debugger Backend</a:t>
+            </a:r>
+          </a:p>
+        </p:txBody>
+      </p:sp>
+      <p:sp>
+        <p:nvSpPr>
+          <p:cNvPr id="10" name="TextBox 9"/>
+          <p:cNvSpPr txBox="1"/>
+          <p:nvPr/>
+        </p:nvSpPr>
+        <p:spPr>
+          <a:xfrm>
+            <a:off x="4922520" y="3083396"/>
+            <a:ext cx="3728430" cy="369332"/>
+          </a:xfrm>
+          <a:prstGeom prst="rect">
+            <a:avLst/>
+          </a:prstGeom>
+          <a:noFill/>
+        </p:spPr>
+        <p:txBody>
+          <a:bodyPr wrap="square" rtlCol="0">
+            <a:spAutoFit/>
+          </a:bodyPr>
+          <a:lstStyle/>
+          <a:p>
+            <a:r>
+              <a:rPr lang="en-US" b="1" dirty="0"/>
+              <a:t>Assembler</a:t>
+            </a:r>
+          </a:p>
+        </p:txBody>
+      </p:sp>
+      <p:sp>
+        <p:nvSpPr>
+          <p:cNvPr id="12" name="TextBox 11"/>
+          <p:cNvSpPr txBox="1"/>
+          <p:nvPr/>
+        </p:nvSpPr>
+        <p:spPr>
+          <a:xfrm>
+            <a:off x="7491297" y="4459674"/>
+            <a:ext cx="3728430" cy="369332"/>
+          </a:xfrm>
+          <a:prstGeom prst="rect">
+            <a:avLst/>
+          </a:prstGeom>
+          <a:noFill/>
+        </p:spPr>
+        <p:txBody>
+          <a:bodyPr wrap="square" rtlCol="0">
+            <a:spAutoFit/>
+          </a:bodyPr>
+          <a:lstStyle/>
+          <a:p>
+            <a:r>
+              <a:rPr lang="en-US" b="1" dirty="0"/>
+              <a:t>Import</a:t>
+            </a:r>
+          </a:p>
+        </p:txBody>
+      </p:sp>
+      <p:sp>
+        <p:nvSpPr>
+          <p:cNvPr id="13" name="TextBox 12"/>
+          <p:cNvSpPr txBox="1"/>
+          <p:nvPr/>
+        </p:nvSpPr>
+        <p:spPr>
+          <a:xfrm>
+            <a:off x="9967840" y="3058960"/>
+            <a:ext cx="3728430" cy="369332"/>
+          </a:xfrm>
+          <a:prstGeom prst="rect">
+            <a:avLst/>
+          </a:prstGeom>
+          <a:noFill/>
+        </p:spPr>
+        <p:txBody>
+          <a:bodyPr wrap="square" rtlCol="0">
+            <a:spAutoFit/>
+          </a:bodyPr>
+          <a:lstStyle/>
+          <a:p>
+            <a:r>
+              <a:rPr lang="en-US" b="1" dirty="0"/>
+              <a:t>Databank</a:t>
+            </a:r>
+          </a:p>
+        </p:txBody>
+      </p:sp>
+      <p:sp>
+        <p:nvSpPr>
+          <p:cNvPr id="14" name="TextBox 13"/>
+          <p:cNvSpPr txBox="1"/>
+          <p:nvPr/>
+        </p:nvSpPr>
+        <p:spPr>
+          <a:xfrm>
+            <a:off x="5627082" y="2056732"/>
+            <a:ext cx="2075670" cy="646331"/>
+          </a:xfrm>
+          <a:prstGeom prst="rect">
+            <a:avLst/>
+          </a:prstGeom>
+          <a:noFill/>
+        </p:spPr>
+        <p:txBody>
+          <a:bodyPr wrap="square" rtlCol="0">
+            <a:spAutoFit/>
+          </a:bodyPr>
+          <a:lstStyle/>
+          <a:p>
+            <a:pPr algn="ctr"/>
+            <a:r>
+              <a:rPr lang="en-US" dirty="0"/>
+              <a:t>All frames and viewing panels</a:t>
+            </a:r>
+          </a:p>
+        </p:txBody>
+      </p:sp>
+      <p:sp>
+        <p:nvSpPr>
+          <p:cNvPr id="15" name="TextBox 14"/>
+          <p:cNvSpPr txBox="1"/>
+          <p:nvPr/>
+        </p:nvSpPr>
+        <p:spPr>
+          <a:xfrm>
+            <a:off x="8463570" y="1925912"/>
+            <a:ext cx="2075670" cy="923330"/>
+          </a:xfrm>
+          <a:prstGeom prst="rect">
+            <a:avLst/>
+          </a:prstGeom>
+          <a:noFill/>
+        </p:spPr>
+        <p:txBody>
+          <a:bodyPr wrap="square" rtlCol="0">
+            <a:spAutoFit/>
+          </a:bodyPr>
+          <a:lstStyle/>
+          <a:p>
+            <a:pPr algn="ctr"/>
+            <a:r>
+              <a:rPr lang="en-US" dirty="0"/>
+              <a:t>Supports viewing, and accesses the processor interface</a:t>
+            </a:r>
+          </a:p>
+        </p:txBody>
+      </p:sp>
+      <p:sp>
+        <p:nvSpPr>
+          <p:cNvPr id="16" name="TextBox 15"/>
+          <p:cNvSpPr txBox="1"/>
+          <p:nvPr/>
+        </p:nvSpPr>
+        <p:spPr>
+          <a:xfrm>
+            <a:off x="4589247" y="3571509"/>
+            <a:ext cx="2075670" cy="646331"/>
+          </a:xfrm>
+          <a:prstGeom prst="rect">
+            <a:avLst/>
+          </a:prstGeom>
+          <a:noFill/>
+        </p:spPr>
+        <p:txBody>
+          <a:bodyPr wrap="square" rtlCol="0">
+            <a:spAutoFit/>
+          </a:bodyPr>
+          <a:lstStyle/>
+          <a:p>
+            <a:pPr algn="ctr"/>
+            <a:r>
+              <a:rPr lang="en-US" dirty="0"/>
+              <a:t>Converts assembly into binary code</a:t>
+            </a:r>
+          </a:p>
+        </p:txBody>
+      </p:sp>
+      <p:sp>
+        <p:nvSpPr>
+          <p:cNvPr id="17" name="TextBox 16"/>
+          <p:cNvSpPr txBox="1"/>
+          <p:nvPr/>
+        </p:nvSpPr>
+        <p:spPr>
+          <a:xfrm>
+            <a:off x="7034602" y="3486409"/>
+            <a:ext cx="2075670" cy="923330"/>
+          </a:xfrm>
+          <a:prstGeom prst="rect">
+            <a:avLst/>
+          </a:prstGeom>
+          <a:noFill/>
+        </p:spPr>
+        <p:txBody>
+          <a:bodyPr wrap="square" rtlCol="0">
+            <a:spAutoFit/>
+          </a:bodyPr>
+          <a:lstStyle/>
+          <a:p>
+            <a:pPr algn="ctr"/>
+            <a:r>
+              <a:rPr lang="en-US" dirty="0"/>
+              <a:t>Parses user input and handles user errors</a:t>
+            </a:r>
+          </a:p>
+        </p:txBody>
+      </p:sp>
+      <p:sp>
+        <p:nvSpPr>
+          <p:cNvPr id="18" name="TextBox 17"/>
+          <p:cNvSpPr txBox="1"/>
+          <p:nvPr/>
+        </p:nvSpPr>
+        <p:spPr>
+          <a:xfrm>
+            <a:off x="9479957" y="3483660"/>
+            <a:ext cx="2075670" cy="923330"/>
+          </a:xfrm>
+          <a:prstGeom prst="rect">
+            <a:avLst/>
+          </a:prstGeom>
+          <a:noFill/>
+        </p:spPr>
+        <p:txBody>
+          <a:bodyPr wrap="square" rtlCol="0">
+            <a:spAutoFit/>
+          </a:bodyPr>
+          <a:lstStyle/>
+          <a:p>
+            <a:pPr algn="ctr"/>
+            <a:r>
+              <a:rPr lang="en-US" dirty="0"/>
+              <a:t>Contains mapping of assembly to binary opcode</a:t>
+            </a:r>
           </a:p>
         </p:txBody>
       </p:sp>
@@ -5177,6 +5506,117 @@
     <p:extLst>
       <p:ext uri="{BB962C8B-B14F-4D97-AF65-F5344CB8AC3E}">
         <p14:creationId xmlns:p14="http://schemas.microsoft.com/office/powerpoint/2010/main" val="2089652613"/>
+      </p:ext>
+    </p:extLst>
+  </p:cSld>
+  <p:clrMapOvr>
+    <a:masterClrMapping/>
+  </p:clrMapOvr>
+</p:sld>
+</file>
+
+<file path=ppt/slides/slide6.xml><?xml version="1.0" encoding="utf-8"?>
+<p:sld xmlns:a="http://schemas.openxmlformats.org/drawingml/2006/main" xmlns:r="http://schemas.openxmlformats.org/officeDocument/2006/relationships" xmlns:p="http://schemas.openxmlformats.org/presentationml/2006/main">
+  <p:cSld>
+    <p:spTree>
+      <p:nvGrpSpPr>
+        <p:cNvPr id="1" name=""/>
+        <p:cNvGrpSpPr/>
+        <p:nvPr/>
+      </p:nvGrpSpPr>
+      <p:grpSpPr>
+        <a:xfrm>
+          <a:off x="0" y="0"/>
+          <a:ext cx="0" cy="0"/>
+          <a:chOff x="0" y="0"/>
+          <a:chExt cx="0" cy="0"/>
+        </a:xfrm>
+      </p:grpSpPr>
+      <p:pic>
+        <p:nvPicPr>
+          <p:cNvPr id="3" name="Picture 2"/>
+          <p:cNvPicPr>
+            <a:picLocks noChangeAspect="1"/>
+          </p:cNvPicPr>
+          <p:nvPr/>
+        </p:nvPicPr>
+        <p:blipFill>
+          <a:blip r:embed="rId2"/>
+          <a:stretch>
+            <a:fillRect/>
+          </a:stretch>
+        </p:blipFill>
+        <p:spPr>
+          <a:xfrm rot="1451908">
+            <a:off x="1489731" y="102225"/>
+            <a:ext cx="1528147" cy="1528147"/>
+          </a:xfrm>
+          <a:prstGeom prst="rect">
+            <a:avLst/>
+          </a:prstGeom>
+        </p:spPr>
+      </p:pic>
+      <p:sp>
+        <p:nvSpPr>
+          <p:cNvPr id="11" name="Title 1"/>
+          <p:cNvSpPr txBox="1">
+            <a:spLocks/>
+          </p:cNvSpPr>
+          <p:nvPr/>
+        </p:nvSpPr>
+        <p:spPr>
+          <a:xfrm>
+            <a:off x="745235" y="878967"/>
+            <a:ext cx="3017140" cy="997458"/>
+          </a:xfrm>
+          <a:prstGeom prst="rect">
+            <a:avLst/>
+          </a:prstGeom>
+          <a:solidFill>
+            <a:srgbClr val="FFFFFF"/>
+          </a:solidFill>
+          <a:ln w="38100" cap="sq">
+            <a:solidFill>
+              <a:srgbClr val="404040"/>
+            </a:solidFill>
+            <a:miter lim="800000"/>
+          </a:ln>
+        </p:spPr>
+        <p:txBody>
+          <a:bodyPr vert="horz" lIns="274320" tIns="182880" rIns="274320" bIns="182880" rtlCol="0" anchor="ctr" anchorCtr="1">
+            <a:noAutofit/>
+          </a:bodyPr>
+          <a:lstStyle>
+            <a:lvl1pPr algn="ctr" defTabSz="914400" rtl="0" eaLnBrk="1" latinLnBrk="0" hangingPunct="1">
+              <a:lnSpc>
+                <a:spcPct val="90000"/>
+              </a:lnSpc>
+              <a:spcBef>
+                <a:spcPct val="0"/>
+              </a:spcBef>
+              <a:buNone/>
+              <a:defRPr sz="3800" kern="1200" cap="all" spc="200" baseline="0">
+                <a:solidFill>
+                  <a:srgbClr val="262626"/>
+                </a:solidFill>
+                <a:latin typeface="+mj-lt"/>
+                <a:ea typeface="+mj-ea"/>
+                <a:cs typeface="+mj-cs"/>
+              </a:defRPr>
+            </a:lvl1pPr>
+          </a:lstStyle>
+          <a:p>
+            <a:r>
+              <a:rPr lang="en-US" sz="2500" dirty="0"/>
+              <a:t>Application</a:t>
+            </a:r>
+          </a:p>
+        </p:txBody>
+      </p:sp>
+    </p:spTree>
+    <p:extLst>
+      <p:ext uri="{BB962C8B-B14F-4D97-AF65-F5344CB8AC3E}">
+        <p14:creationId xmlns:p14="http://schemas.microsoft.com/office/powerpoint/2010/main" val="2441339512"/>
       </p:ext>
     </p:extLst>
   </p:cSld>

</xml_diff>